<commit_message>
correction to stellar horizons sop
</commit_message>
<xml_diff>
--- a/Stellar Horizons SoP/Stellar Horizons SOP cards.pptx
+++ b/Stellar Horizons SoP/Stellar Horizons SOP cards.pptx
@@ -212,7 +212,7 @@
           <a:p>
             <a:fld id="{C1B87C5B-8331-6742-A7E3-DC5C24D95CA3}" type="datetimeFigureOut">
               <a:rPr lang="en-IT" smtClean="0"/>
-              <a:t>17/12/24</a:t>
+              <a:t>18/12/24</a:t>
             </a:fld>
             <a:endParaRPr lang="en-IT"/>
           </a:p>
@@ -1039,7 +1039,7 @@
           <a:p>
             <a:fld id="{0E4F425A-E00F-4AAE-A11C-B8D799E92BCC}" type="datetimeFigureOut">
               <a:rPr lang="en-US" smtClean="0"/>
-              <a:t>12/17/24</a:t>
+              <a:t>12/18/24</a:t>
             </a:fld>
             <a:endParaRPr lang="en-US"/>
           </a:p>
@@ -1209,7 +1209,7 @@
           <a:p>
             <a:fld id="{0E4F425A-E00F-4AAE-A11C-B8D799E92BCC}" type="datetimeFigureOut">
               <a:rPr lang="en-US" smtClean="0"/>
-              <a:t>12/17/24</a:t>
+              <a:t>12/18/24</a:t>
             </a:fld>
             <a:endParaRPr lang="en-US"/>
           </a:p>
@@ -1389,7 +1389,7 @@
           <a:p>
             <a:fld id="{0E4F425A-E00F-4AAE-A11C-B8D799E92BCC}" type="datetimeFigureOut">
               <a:rPr lang="en-US" smtClean="0"/>
-              <a:t>12/17/24</a:t>
+              <a:t>12/18/24</a:t>
             </a:fld>
             <a:endParaRPr lang="en-US"/>
           </a:p>
@@ -1559,7 +1559,7 @@
           <a:p>
             <a:fld id="{0E4F425A-E00F-4AAE-A11C-B8D799E92BCC}" type="datetimeFigureOut">
               <a:rPr lang="en-US" smtClean="0"/>
-              <a:t>12/17/24</a:t>
+              <a:t>12/18/24</a:t>
             </a:fld>
             <a:endParaRPr lang="en-US"/>
           </a:p>
@@ -1803,7 +1803,7 @@
           <a:p>
             <a:fld id="{0E4F425A-E00F-4AAE-A11C-B8D799E92BCC}" type="datetimeFigureOut">
               <a:rPr lang="en-US" smtClean="0"/>
-              <a:t>12/17/24</a:t>
+              <a:t>12/18/24</a:t>
             </a:fld>
             <a:endParaRPr lang="en-US"/>
           </a:p>
@@ -2035,7 +2035,7 @@
           <a:p>
             <a:fld id="{0E4F425A-E00F-4AAE-A11C-B8D799E92BCC}" type="datetimeFigureOut">
               <a:rPr lang="en-US" smtClean="0"/>
-              <a:t>12/17/24</a:t>
+              <a:t>12/18/24</a:t>
             </a:fld>
             <a:endParaRPr lang="en-US"/>
           </a:p>
@@ -2402,7 +2402,7 @@
           <a:p>
             <a:fld id="{0E4F425A-E00F-4AAE-A11C-B8D799E92BCC}" type="datetimeFigureOut">
               <a:rPr lang="en-US" smtClean="0"/>
-              <a:t>12/17/24</a:t>
+              <a:t>12/18/24</a:t>
             </a:fld>
             <a:endParaRPr lang="en-US"/>
           </a:p>
@@ -2520,7 +2520,7 @@
           <a:p>
             <a:fld id="{0E4F425A-E00F-4AAE-A11C-B8D799E92BCC}" type="datetimeFigureOut">
               <a:rPr lang="en-US" smtClean="0"/>
-              <a:t>12/17/24</a:t>
+              <a:t>12/18/24</a:t>
             </a:fld>
             <a:endParaRPr lang="en-US"/>
           </a:p>
@@ -2615,7 +2615,7 @@
           <a:p>
             <a:fld id="{0E4F425A-E00F-4AAE-A11C-B8D799E92BCC}" type="datetimeFigureOut">
               <a:rPr lang="en-US" smtClean="0"/>
-              <a:t>12/17/24</a:t>
+              <a:t>12/18/24</a:t>
             </a:fld>
             <a:endParaRPr lang="en-US"/>
           </a:p>
@@ -2892,7 +2892,7 @@
           <a:p>
             <a:fld id="{0E4F425A-E00F-4AAE-A11C-B8D799E92BCC}" type="datetimeFigureOut">
               <a:rPr lang="en-US" smtClean="0"/>
-              <a:t>12/17/24</a:t>
+              <a:t>12/18/24</a:t>
             </a:fld>
             <a:endParaRPr lang="en-US"/>
           </a:p>
@@ -3149,7 +3149,7 @@
           <a:p>
             <a:fld id="{0E4F425A-E00F-4AAE-A11C-B8D799E92BCC}" type="datetimeFigureOut">
               <a:rPr lang="en-US" smtClean="0"/>
-              <a:t>12/17/24</a:t>
+              <a:t>12/18/24</a:t>
             </a:fld>
             <a:endParaRPr lang="en-US"/>
           </a:p>
@@ -3362,7 +3362,7 @@
           <a:p>
             <a:fld id="{0E4F425A-E00F-4AAE-A11C-B8D799E92BCC}" type="datetimeFigureOut">
               <a:rPr lang="en-US" smtClean="0"/>
-              <a:t>12/17/24</a:t>
+              <a:t>12/18/24</a:t>
             </a:fld>
             <a:endParaRPr lang="en-US"/>
           </a:p>
@@ -15062,8 +15062,8 @@
         </p:nvSpPr>
         <p:spPr>
           <a:xfrm>
-            <a:off x="4628052" y="761998"/>
-            <a:ext cx="2211663" cy="2246769"/>
+            <a:off x="4602499" y="673673"/>
+            <a:ext cx="2267722" cy="2554545"/>
           </a:xfrm>
           <a:prstGeom prst="rect">
             <a:avLst/>
@@ -15156,7 +15156,7 @@
                   <a:srgbClr val="000000"/>
                 </a:solidFill>
               </a:rPr>
-              <a:t>Roll for resource production</a:t>
+              <a:t>Roll 1d10 for resource production</a:t>
             </a:r>
             <a:r>
               <a:rPr lang="en-GB" sz="1000" dirty="0">
@@ -15164,7 +15164,7 @@
                   <a:srgbClr val="000000"/>
                 </a:solidFill>
               </a:rPr>
-              <a:t>. You always produce at least one.</a:t>
+              <a:t>. You always produce at least one. +1 if modified roll &lt;= world production value. +1 if mod roll = 0 or 1</a:t>
             </a:r>
           </a:p>
           <a:p>

</xml_diff>